<commit_message>
Modified the PowerPoint Presentation File
</commit_message>
<xml_diff>
--- a/Farida_Stocks_Presentation/Stock_Presentation_Farida_v3.pptx
+++ b/Farida_Stocks_Presentation/Stock_Presentation_Farida_v3.pptx
@@ -268,7 +268,7 @@
           <a:p>
             <a:fld id="{8184139C-67AB-4ACC-AAF5-D3F16FF267D9}" type="datetimeFigureOut">
               <a:rPr lang="en-US" smtClean="0"/>
-              <a:t>12/6/2021</a:t>
+              <a:t>12/8/2021</a:t>
             </a:fld>
             <a:endParaRPr lang="en-US"/>
           </a:p>
@@ -466,7 +466,7 @@
           <a:p>
             <a:fld id="{8184139C-67AB-4ACC-AAF5-D3F16FF267D9}" type="datetimeFigureOut">
               <a:rPr lang="en-US" smtClean="0"/>
-              <a:t>12/6/2021</a:t>
+              <a:t>12/8/2021</a:t>
             </a:fld>
             <a:endParaRPr lang="en-US"/>
           </a:p>
@@ -674,7 +674,7 @@
           <a:p>
             <a:fld id="{8184139C-67AB-4ACC-AAF5-D3F16FF267D9}" type="datetimeFigureOut">
               <a:rPr lang="en-US" smtClean="0"/>
-              <a:t>12/6/2021</a:t>
+              <a:t>12/8/2021</a:t>
             </a:fld>
             <a:endParaRPr lang="en-US"/>
           </a:p>
@@ -872,7 +872,7 @@
           <a:p>
             <a:fld id="{8184139C-67AB-4ACC-AAF5-D3F16FF267D9}" type="datetimeFigureOut">
               <a:rPr lang="en-US" smtClean="0"/>
-              <a:t>12/6/2021</a:t>
+              <a:t>12/8/2021</a:t>
             </a:fld>
             <a:endParaRPr lang="en-US"/>
           </a:p>
@@ -1147,7 +1147,7 @@
           <a:p>
             <a:fld id="{8184139C-67AB-4ACC-AAF5-D3F16FF267D9}" type="datetimeFigureOut">
               <a:rPr lang="en-US" smtClean="0"/>
-              <a:t>12/6/2021</a:t>
+              <a:t>12/8/2021</a:t>
             </a:fld>
             <a:endParaRPr lang="en-US"/>
           </a:p>
@@ -1412,7 +1412,7 @@
           <a:p>
             <a:fld id="{8184139C-67AB-4ACC-AAF5-D3F16FF267D9}" type="datetimeFigureOut">
               <a:rPr lang="en-US" smtClean="0"/>
-              <a:t>12/6/2021</a:t>
+              <a:t>12/8/2021</a:t>
             </a:fld>
             <a:endParaRPr lang="en-US"/>
           </a:p>
@@ -1824,7 +1824,7 @@
           <a:p>
             <a:fld id="{8184139C-67AB-4ACC-AAF5-D3F16FF267D9}" type="datetimeFigureOut">
               <a:rPr lang="en-US" smtClean="0"/>
-              <a:t>12/6/2021</a:t>
+              <a:t>12/8/2021</a:t>
             </a:fld>
             <a:endParaRPr lang="en-US"/>
           </a:p>
@@ -1965,7 +1965,7 @@
           <a:p>
             <a:fld id="{8184139C-67AB-4ACC-AAF5-D3F16FF267D9}" type="datetimeFigureOut">
               <a:rPr lang="en-US" smtClean="0"/>
-              <a:t>12/6/2021</a:t>
+              <a:t>12/8/2021</a:t>
             </a:fld>
             <a:endParaRPr lang="en-US"/>
           </a:p>
@@ -2078,7 +2078,7 @@
           <a:p>
             <a:fld id="{8184139C-67AB-4ACC-AAF5-D3F16FF267D9}" type="datetimeFigureOut">
               <a:rPr lang="en-US" smtClean="0"/>
-              <a:t>12/6/2021</a:t>
+              <a:t>12/8/2021</a:t>
             </a:fld>
             <a:endParaRPr lang="en-US"/>
           </a:p>
@@ -2389,7 +2389,7 @@
           <a:p>
             <a:fld id="{8184139C-67AB-4ACC-AAF5-D3F16FF267D9}" type="datetimeFigureOut">
               <a:rPr lang="en-US" smtClean="0"/>
-              <a:t>12/6/2021</a:t>
+              <a:t>12/8/2021</a:t>
             </a:fld>
             <a:endParaRPr lang="en-US"/>
           </a:p>
@@ -2677,7 +2677,7 @@
           <a:p>
             <a:fld id="{8184139C-67AB-4ACC-AAF5-D3F16FF267D9}" type="datetimeFigureOut">
               <a:rPr lang="en-US" smtClean="0"/>
-              <a:t>12/6/2021</a:t>
+              <a:t>12/8/2021</a:t>
             </a:fld>
             <a:endParaRPr lang="en-US"/>
           </a:p>
@@ -2918,7 +2918,7 @@
           <a:p>
             <a:fld id="{8184139C-67AB-4ACC-AAF5-D3F16FF267D9}" type="datetimeFigureOut">
               <a:rPr lang="en-US" smtClean="0"/>
-              <a:t>12/6/2021</a:t>
+              <a:t>12/8/2021</a:t>
             </a:fld>
             <a:endParaRPr lang="en-US"/>
           </a:p>
@@ -3581,12 +3581,19 @@
         </p:blipFill>
         <p:spPr>
           <a:xfrm>
-            <a:off x="6871854" y="3263806"/>
-            <a:ext cx="3970698" cy="3364765"/>
+            <a:off x="6871854" y="2902541"/>
+            <a:ext cx="3847853" cy="3260666"/>
           </a:xfrm>
           <a:prstGeom prst="rect">
             <a:avLst/>
           </a:prstGeom>
+          <a:ln>
+            <a:solidFill>
+              <a:schemeClr val="bg1">
+                <a:lumMod val="85000"/>
+              </a:schemeClr>
+            </a:solidFill>
+          </a:ln>
         </p:spPr>
       </p:pic>
       <p:sp>
@@ -3695,13 +3702,13 @@
           <p:nvPr>
             <p:extLst>
               <p:ext uri="{D42A27DB-BD31-4B8C-83A1-F6EECF244321}">
-                <p14:modId xmlns:p14="http://schemas.microsoft.com/office/powerpoint/2010/main" val="1616646121"/>
+                <p14:modId xmlns:p14="http://schemas.microsoft.com/office/powerpoint/2010/main" val="866302376"/>
               </p:ext>
             </p:extLst>
           </p:nvPr>
         </p:nvGraphicFramePr>
         <p:xfrm>
-          <a:off x="7940979" y="842612"/>
+          <a:off x="7913638" y="511681"/>
           <a:ext cx="3614554" cy="2622086"/>
         </p:xfrm>
         <a:graphic>
@@ -3782,6 +3789,9 @@
                       <a:headEnd type="none" w="med" len="med"/>
                       <a:tailEnd type="none" w="med" len="med"/>
                     </a:lnB>
+                    <a:solidFill>
+                      <a:schemeClr val="bg1"/>
+                    </a:solidFill>
                   </a:tcPr>
                 </a:tc>
                 <a:tc>
@@ -3832,6 +3842,9 @@
                       <a:headEnd type="none" w="med" len="med"/>
                       <a:tailEnd type="none" w="med" len="med"/>
                     </a:lnB>
+                    <a:solidFill>
+                      <a:schemeClr val="bg1"/>
+                    </a:solidFill>
                   </a:tcPr>
                 </a:tc>
                 <a:tc>
@@ -3882,6 +3895,9 @@
                       <a:headEnd type="none" w="med" len="med"/>
                       <a:tailEnd type="none" w="med" len="med"/>
                     </a:lnB>
+                    <a:solidFill>
+                      <a:schemeClr val="bg1"/>
+                    </a:solidFill>
                   </a:tcPr>
                 </a:tc>
                 <a:extLst>
@@ -3939,6 +3955,9 @@
                       <a:headEnd type="none" w="med" len="med"/>
                       <a:tailEnd type="none" w="med" len="med"/>
                     </a:lnB>
+                    <a:solidFill>
+                      <a:schemeClr val="bg1"/>
+                    </a:solidFill>
                   </a:tcPr>
                 </a:tc>
                 <a:tc>
@@ -3989,6 +4008,9 @@
                       <a:headEnd type="none" w="med" len="med"/>
                       <a:tailEnd type="none" w="med" len="med"/>
                     </a:lnB>
+                    <a:solidFill>
+                      <a:schemeClr val="bg1"/>
+                    </a:solidFill>
                   </a:tcPr>
                 </a:tc>
                 <a:tc>
@@ -4039,6 +4061,9 @@
                       <a:headEnd type="none" w="med" len="med"/>
                       <a:tailEnd type="none" w="med" len="med"/>
                     </a:lnB>
+                    <a:solidFill>
+                      <a:schemeClr val="bg1"/>
+                    </a:solidFill>
                   </a:tcPr>
                 </a:tc>
                 <a:extLst>
@@ -4096,6 +4121,9 @@
                       <a:headEnd type="none" w="med" len="med"/>
                       <a:tailEnd type="none" w="med" len="med"/>
                     </a:lnB>
+                    <a:solidFill>
+                      <a:schemeClr val="bg1"/>
+                    </a:solidFill>
                   </a:tcPr>
                 </a:tc>
                 <a:tc>
@@ -4146,6 +4174,9 @@
                       <a:headEnd type="none" w="med" len="med"/>
                       <a:tailEnd type="none" w="med" len="med"/>
                     </a:lnB>
+                    <a:solidFill>
+                      <a:schemeClr val="bg1"/>
+                    </a:solidFill>
                   </a:tcPr>
                 </a:tc>
                 <a:tc>
@@ -4196,6 +4227,9 @@
                       <a:headEnd type="none" w="med" len="med"/>
                       <a:tailEnd type="none" w="med" len="med"/>
                     </a:lnB>
+                    <a:solidFill>
+                      <a:schemeClr val="bg1"/>
+                    </a:solidFill>
                   </a:tcPr>
                 </a:tc>
                 <a:extLst>
@@ -4253,6 +4287,9 @@
                       <a:headEnd type="none" w="med" len="med"/>
                       <a:tailEnd type="none" w="med" len="med"/>
                     </a:lnB>
+                    <a:solidFill>
+                      <a:schemeClr val="bg1"/>
+                    </a:solidFill>
                   </a:tcPr>
                 </a:tc>
                 <a:tc>
@@ -4303,6 +4340,9 @@
                       <a:headEnd type="none" w="med" len="med"/>
                       <a:tailEnd type="none" w="med" len="med"/>
                     </a:lnB>
+                    <a:solidFill>
+                      <a:schemeClr val="bg1"/>
+                    </a:solidFill>
                   </a:tcPr>
                 </a:tc>
                 <a:tc>
@@ -4353,6 +4393,9 @@
                       <a:headEnd type="none" w="med" len="med"/>
                       <a:tailEnd type="none" w="med" len="med"/>
                     </a:lnB>
+                    <a:solidFill>
+                      <a:schemeClr val="bg1"/>
+                    </a:solidFill>
                   </a:tcPr>
                 </a:tc>
                 <a:extLst>
@@ -4410,6 +4453,9 @@
                       <a:headEnd type="none" w="med" len="med"/>
                       <a:tailEnd type="none" w="med" len="med"/>
                     </a:lnB>
+                    <a:solidFill>
+                      <a:schemeClr val="bg1"/>
+                    </a:solidFill>
                   </a:tcPr>
                 </a:tc>
                 <a:tc>
@@ -4460,6 +4506,9 @@
                       <a:headEnd type="none" w="med" len="med"/>
                       <a:tailEnd type="none" w="med" len="med"/>
                     </a:lnB>
+                    <a:solidFill>
+                      <a:schemeClr val="bg1"/>
+                    </a:solidFill>
                   </a:tcPr>
                 </a:tc>
                 <a:tc>
@@ -4510,6 +4559,9 @@
                       <a:headEnd type="none" w="med" len="med"/>
                       <a:tailEnd type="none" w="med" len="med"/>
                     </a:lnB>
+                    <a:solidFill>
+                      <a:schemeClr val="bg1"/>
+                    </a:solidFill>
                   </a:tcPr>
                 </a:tc>
                 <a:extLst>
@@ -4567,6 +4619,9 @@
                       <a:headEnd type="none" w="med" len="med"/>
                       <a:tailEnd type="none" w="med" len="med"/>
                     </a:lnB>
+                    <a:solidFill>
+                      <a:schemeClr val="bg1"/>
+                    </a:solidFill>
                   </a:tcPr>
                 </a:tc>
                 <a:tc>
@@ -4617,6 +4672,9 @@
                       <a:headEnd type="none" w="med" len="med"/>
                       <a:tailEnd type="none" w="med" len="med"/>
                     </a:lnB>
+                    <a:solidFill>
+                      <a:schemeClr val="bg1"/>
+                    </a:solidFill>
                   </a:tcPr>
                 </a:tc>
                 <a:tc>
@@ -4667,6 +4725,9 @@
                       <a:headEnd type="none" w="med" len="med"/>
                       <a:tailEnd type="none" w="med" len="med"/>
                     </a:lnB>
+                    <a:solidFill>
+                      <a:schemeClr val="bg1"/>
+                    </a:solidFill>
                   </a:tcPr>
                 </a:tc>
                 <a:extLst>
@@ -4679,114 +4740,135 @@
           </a:graphicData>
         </a:graphic>
       </p:graphicFrame>
-      <p:pic>
-        <p:nvPicPr>
-          <p:cNvPr id="4" name="Picture 3">
+      <p:grpSp>
+        <p:nvGrpSpPr>
+          <p:cNvPr id="3" name="Group 2">
             <a:extLst>
               <a:ext uri="{FF2B5EF4-FFF2-40B4-BE49-F238E27FC236}">
-                <a16:creationId xmlns:a16="http://schemas.microsoft.com/office/drawing/2014/main" id="{F211C2ED-CF07-4F2C-93A7-902AF3A45E64}"/>
+                <a16:creationId xmlns:a16="http://schemas.microsoft.com/office/drawing/2014/main" id="{34240334-D9A2-4326-8EF4-3E924EAB1AAD}"/>
               </a:ext>
             </a:extLst>
           </p:cNvPr>
-          <p:cNvPicPr>
-            <a:picLocks noChangeAspect="1"/>
-          </p:cNvPicPr>
+          <p:cNvGrpSpPr/>
           <p:nvPr/>
-        </p:nvPicPr>
-        <p:blipFill rotWithShape="1">
-          <a:blip r:embed="rId3"/>
-          <a:srcRect t="11206"/>
-          <a:stretch/>
-        </p:blipFill>
-        <p:spPr>
+        </p:nvGrpSpPr>
+        <p:grpSpPr>
           <a:xfrm>
-            <a:off x="214638" y="1414015"/>
+            <a:off x="214638" y="1118782"/>
             <a:ext cx="5025954" cy="2014985"/>
+            <a:chOff x="214638" y="1118782"/>
+            <a:chExt cx="5025954" cy="2014985"/>
           </a:xfrm>
-          <a:prstGeom prst="rect">
-            <a:avLst/>
-          </a:prstGeom>
-        </p:spPr>
-      </p:pic>
-      <p:sp>
-        <p:nvSpPr>
-          <p:cNvPr id="11" name="TextBox 10">
-            <a:extLst>
-              <a:ext uri="{FF2B5EF4-FFF2-40B4-BE49-F238E27FC236}">
-                <a16:creationId xmlns:a16="http://schemas.microsoft.com/office/drawing/2014/main" id="{8B1C5635-9FEB-4697-981D-66C5696A2EB1}"/>
-              </a:ext>
-            </a:extLst>
-          </p:cNvPr>
-          <p:cNvSpPr txBox="1"/>
-          <p:nvPr/>
-        </p:nvSpPr>
-        <p:spPr>
-          <a:xfrm>
-            <a:off x="2443744" y="1991346"/>
-            <a:ext cx="682674" cy="338554"/>
-          </a:xfrm>
-          <a:prstGeom prst="rect">
-            <a:avLst/>
-          </a:prstGeom>
-          <a:noFill/>
-        </p:spPr>
-        <p:txBody>
-          <a:bodyPr wrap="square" rtlCol="0">
-            <a:spAutoFit/>
-          </a:bodyPr>
-          <a:lstStyle/>
-          <a:p>
-            <a:r>
-              <a:rPr lang="en-US" sz="1600" dirty="0"/>
-              <a:t>k = 5</a:t>
-            </a:r>
-          </a:p>
-        </p:txBody>
-      </p:sp>
-      <p:cxnSp>
-        <p:nvCxnSpPr>
-          <p:cNvPr id="12" name="Straight Arrow Connector 11">
-            <a:extLst>
-              <a:ext uri="{FF2B5EF4-FFF2-40B4-BE49-F238E27FC236}">
-                <a16:creationId xmlns:a16="http://schemas.microsoft.com/office/drawing/2014/main" id="{5428F4FE-EDD2-41C0-9B50-A4E4BF379922}"/>
-              </a:ext>
-            </a:extLst>
-          </p:cNvPr>
-          <p:cNvCxnSpPr>
-            <a:cxnSpLocks/>
-          </p:cNvCxnSpPr>
-          <p:nvPr/>
-        </p:nvCxnSpPr>
-        <p:spPr>
-          <a:xfrm>
-            <a:off x="2785081" y="2264669"/>
-            <a:ext cx="0" cy="337870"/>
-          </a:xfrm>
-          <a:prstGeom prst="straightConnector1">
-            <a:avLst/>
-          </a:prstGeom>
-          <a:ln>
-            <a:solidFill>
-              <a:srgbClr val="FF0000"/>
-            </a:solidFill>
-            <a:tailEnd type="triangle"/>
-          </a:ln>
-        </p:spPr>
-        <p:style>
-          <a:lnRef idx="1">
-            <a:schemeClr val="accent1"/>
-          </a:lnRef>
-          <a:fillRef idx="0">
-            <a:schemeClr val="accent1"/>
-          </a:fillRef>
-          <a:effectRef idx="0">
-            <a:schemeClr val="accent1"/>
-          </a:effectRef>
-          <a:fontRef idx="minor">
-            <a:schemeClr val="tx1"/>
-          </a:fontRef>
-        </p:style>
-      </p:cxnSp>
+        </p:grpSpPr>
+        <p:pic>
+          <p:nvPicPr>
+            <p:cNvPr id="4" name="Picture 3">
+              <a:extLst>
+                <a:ext uri="{FF2B5EF4-FFF2-40B4-BE49-F238E27FC236}">
+                  <a16:creationId xmlns:a16="http://schemas.microsoft.com/office/drawing/2014/main" id="{F211C2ED-CF07-4F2C-93A7-902AF3A45E64}"/>
+                </a:ext>
+              </a:extLst>
+            </p:cNvPr>
+            <p:cNvPicPr>
+              <a:picLocks noChangeAspect="1"/>
+            </p:cNvPicPr>
+            <p:nvPr/>
+          </p:nvPicPr>
+          <p:blipFill rotWithShape="1">
+            <a:blip r:embed="rId3"/>
+            <a:srcRect t="11206"/>
+            <a:stretch/>
+          </p:blipFill>
+          <p:spPr>
+            <a:xfrm>
+              <a:off x="214638" y="1118782"/>
+              <a:ext cx="5025954" cy="2014985"/>
+            </a:xfrm>
+            <a:prstGeom prst="rect">
+              <a:avLst/>
+            </a:prstGeom>
+          </p:spPr>
+        </p:pic>
+        <p:sp>
+          <p:nvSpPr>
+            <p:cNvPr id="11" name="TextBox 10">
+              <a:extLst>
+                <a:ext uri="{FF2B5EF4-FFF2-40B4-BE49-F238E27FC236}">
+                  <a16:creationId xmlns:a16="http://schemas.microsoft.com/office/drawing/2014/main" id="{8B1C5635-9FEB-4697-981D-66C5696A2EB1}"/>
+                </a:ext>
+              </a:extLst>
+            </p:cNvPr>
+            <p:cNvSpPr txBox="1"/>
+            <p:nvPr/>
+          </p:nvSpPr>
+          <p:spPr>
+            <a:xfrm>
+              <a:off x="2443744" y="1696113"/>
+              <a:ext cx="682674" cy="338554"/>
+            </a:xfrm>
+            <a:prstGeom prst="rect">
+              <a:avLst/>
+            </a:prstGeom>
+            <a:noFill/>
+          </p:spPr>
+          <p:txBody>
+            <a:bodyPr wrap="square" rtlCol="0">
+              <a:spAutoFit/>
+            </a:bodyPr>
+            <a:lstStyle/>
+            <a:p>
+              <a:r>
+                <a:rPr lang="en-US" sz="1600" dirty="0"/>
+                <a:t>k = 5</a:t>
+              </a:r>
+            </a:p>
+          </p:txBody>
+        </p:sp>
+        <p:cxnSp>
+          <p:nvCxnSpPr>
+            <p:cNvPr id="12" name="Straight Arrow Connector 11">
+              <a:extLst>
+                <a:ext uri="{FF2B5EF4-FFF2-40B4-BE49-F238E27FC236}">
+                  <a16:creationId xmlns:a16="http://schemas.microsoft.com/office/drawing/2014/main" id="{5428F4FE-EDD2-41C0-9B50-A4E4BF379922}"/>
+                </a:ext>
+              </a:extLst>
+            </p:cNvPr>
+            <p:cNvCxnSpPr>
+              <a:cxnSpLocks/>
+            </p:cNvCxnSpPr>
+            <p:nvPr/>
+          </p:nvCxnSpPr>
+          <p:spPr>
+            <a:xfrm>
+              <a:off x="2785081" y="1969436"/>
+              <a:ext cx="0" cy="337870"/>
+            </a:xfrm>
+            <a:prstGeom prst="straightConnector1">
+              <a:avLst/>
+            </a:prstGeom>
+            <a:ln>
+              <a:solidFill>
+                <a:srgbClr val="FF0000"/>
+              </a:solidFill>
+              <a:tailEnd type="triangle"/>
+            </a:ln>
+          </p:spPr>
+          <p:style>
+            <a:lnRef idx="1">
+              <a:schemeClr val="accent1"/>
+            </a:lnRef>
+            <a:fillRef idx="0">
+              <a:schemeClr val="accent1"/>
+            </a:fillRef>
+            <a:effectRef idx="0">
+              <a:schemeClr val="accent1"/>
+            </a:effectRef>
+            <a:fontRef idx="minor">
+              <a:schemeClr val="tx1"/>
+            </a:fontRef>
+          </p:style>
+        </p:cxnSp>
+      </p:grpSp>
       <p:graphicFrame>
         <p:nvGraphicFramePr>
           <p:cNvPr id="2" name="Table 2">
@@ -5333,7 +5415,7 @@
         </p:blipFill>
         <p:spPr>
           <a:xfrm>
-            <a:off x="580178" y="3582453"/>
+            <a:off x="580178" y="3245524"/>
             <a:ext cx="4560810" cy="3046119"/>
           </a:xfrm>
           <a:prstGeom prst="rect">
@@ -5348,6 +5430,76 @@
           </a:ln>
         </p:spPr>
       </p:pic>
+      <p:sp>
+        <p:nvSpPr>
+          <p:cNvPr id="13" name="TextBox 12">
+            <a:extLst>
+              <a:ext uri="{FF2B5EF4-FFF2-40B4-BE49-F238E27FC236}">
+                <a16:creationId xmlns:a16="http://schemas.microsoft.com/office/drawing/2014/main" id="{545D4067-D442-43E2-82A2-E674AA97FE89}"/>
+              </a:ext>
+            </a:extLst>
+          </p:cNvPr>
+          <p:cNvSpPr txBox="1"/>
+          <p:nvPr/>
+        </p:nvSpPr>
+        <p:spPr>
+          <a:xfrm>
+            <a:off x="2363124" y="6378148"/>
+            <a:ext cx="840921" cy="307777"/>
+          </a:xfrm>
+          <a:prstGeom prst="rect">
+            <a:avLst/>
+          </a:prstGeom>
+          <a:noFill/>
+        </p:spPr>
+        <p:txBody>
+          <a:bodyPr wrap="square" rtlCol="0">
+            <a:spAutoFit/>
+          </a:bodyPr>
+          <a:lstStyle/>
+          <a:p>
+            <a:r>
+              <a:rPr lang="en-US" sz="1400" b="1" dirty="0"/>
+              <a:t>Fig.1</a:t>
+            </a:r>
+          </a:p>
+        </p:txBody>
+      </p:sp>
+      <p:sp>
+        <p:nvSpPr>
+          <p:cNvPr id="14" name="TextBox 13">
+            <a:extLst>
+              <a:ext uri="{FF2B5EF4-FFF2-40B4-BE49-F238E27FC236}">
+                <a16:creationId xmlns:a16="http://schemas.microsoft.com/office/drawing/2014/main" id="{908B731F-AC4D-4F30-87A2-23F0DA856DFE}"/>
+              </a:ext>
+            </a:extLst>
+          </p:cNvPr>
+          <p:cNvSpPr txBox="1"/>
+          <p:nvPr/>
+        </p:nvSpPr>
+        <p:spPr>
+          <a:xfrm>
+            <a:off x="8444344" y="6407099"/>
+            <a:ext cx="840921" cy="307777"/>
+          </a:xfrm>
+          <a:prstGeom prst="rect">
+            <a:avLst/>
+          </a:prstGeom>
+          <a:noFill/>
+        </p:spPr>
+        <p:txBody>
+          <a:bodyPr wrap="square" rtlCol="0">
+            <a:spAutoFit/>
+          </a:bodyPr>
+          <a:lstStyle/>
+          <a:p>
+            <a:r>
+              <a:rPr lang="en-US" sz="1400" b="1" dirty="0"/>
+              <a:t>Fig.2</a:t>
+            </a:r>
+          </a:p>
+        </p:txBody>
+      </p:sp>
     </p:spTree>
     <p:extLst>
       <p:ext uri="{BB962C8B-B14F-4D97-AF65-F5344CB8AC3E}">
@@ -6832,7 +6984,7 @@
         </p:blipFill>
         <p:spPr>
           <a:xfrm>
-            <a:off x="4496947" y="900791"/>
+            <a:off x="4496947" y="811857"/>
             <a:ext cx="4943996" cy="2173155"/>
           </a:xfrm>
           <a:prstGeom prst="rect">
@@ -6897,7 +7049,7 @@
         </p:blipFill>
         <p:spPr>
           <a:xfrm>
-            <a:off x="7824750" y="3127271"/>
+            <a:off x="7783706" y="3108212"/>
             <a:ext cx="4035321" cy="3347306"/>
           </a:xfrm>
           <a:prstGeom prst="rect">
@@ -8312,6 +8464,76 @@
           </a:fontRef>
         </p:style>
       </p:cxnSp>
+      <p:sp>
+        <p:nvSpPr>
+          <p:cNvPr id="4" name="TextBox 3">
+            <a:extLst>
+              <a:ext uri="{FF2B5EF4-FFF2-40B4-BE49-F238E27FC236}">
+                <a16:creationId xmlns:a16="http://schemas.microsoft.com/office/drawing/2014/main" id="{F4501A62-8C34-40FE-8E48-C9224012F30C}"/>
+              </a:ext>
+            </a:extLst>
+          </p:cNvPr>
+          <p:cNvSpPr txBox="1"/>
+          <p:nvPr/>
+        </p:nvSpPr>
+        <p:spPr>
+          <a:xfrm>
+            <a:off x="4285913" y="6301630"/>
+            <a:ext cx="840921" cy="307777"/>
+          </a:xfrm>
+          <a:prstGeom prst="rect">
+            <a:avLst/>
+          </a:prstGeom>
+          <a:noFill/>
+        </p:spPr>
+        <p:txBody>
+          <a:bodyPr wrap="square" rtlCol="0">
+            <a:spAutoFit/>
+          </a:bodyPr>
+          <a:lstStyle/>
+          <a:p>
+            <a:r>
+              <a:rPr lang="en-US" sz="1400" b="1" dirty="0"/>
+              <a:t>Fig.1</a:t>
+            </a:r>
+          </a:p>
+        </p:txBody>
+      </p:sp>
+      <p:sp>
+        <p:nvSpPr>
+          <p:cNvPr id="11" name="TextBox 10">
+            <a:extLst>
+              <a:ext uri="{FF2B5EF4-FFF2-40B4-BE49-F238E27FC236}">
+                <a16:creationId xmlns:a16="http://schemas.microsoft.com/office/drawing/2014/main" id="{318633B4-1559-4E49-AD34-A5A49E195DEE}"/>
+              </a:ext>
+            </a:extLst>
+          </p:cNvPr>
+          <p:cNvSpPr txBox="1"/>
+          <p:nvPr/>
+        </p:nvSpPr>
+        <p:spPr>
+          <a:xfrm>
+            <a:off x="9915524" y="6455518"/>
+            <a:ext cx="840921" cy="307777"/>
+          </a:xfrm>
+          <a:prstGeom prst="rect">
+            <a:avLst/>
+          </a:prstGeom>
+          <a:noFill/>
+        </p:spPr>
+        <p:txBody>
+          <a:bodyPr wrap="square" rtlCol="0">
+            <a:spAutoFit/>
+          </a:bodyPr>
+          <a:lstStyle/>
+          <a:p>
+            <a:r>
+              <a:rPr lang="en-US" sz="1400" b="1" dirty="0"/>
+              <a:t>Fig.2</a:t>
+            </a:r>
+          </a:p>
+        </p:txBody>
+      </p:sp>
     </p:spTree>
     <p:extLst>
       <p:ext uri="{BB962C8B-B14F-4D97-AF65-F5344CB8AC3E}">
@@ -10702,6 +10924,111 @@
           </p:style>
         </p:cxnSp>
       </p:grpSp>
+      <p:sp>
+        <p:nvSpPr>
+          <p:cNvPr id="18" name="TextBox 17">
+            <a:extLst>
+              <a:ext uri="{FF2B5EF4-FFF2-40B4-BE49-F238E27FC236}">
+                <a16:creationId xmlns:a16="http://schemas.microsoft.com/office/drawing/2014/main" id="{B263A387-C5B3-40EE-A834-604E72287BF2}"/>
+              </a:ext>
+            </a:extLst>
+          </p:cNvPr>
+          <p:cNvSpPr txBox="1"/>
+          <p:nvPr/>
+        </p:nvSpPr>
+        <p:spPr>
+          <a:xfrm>
+            <a:off x="1998494" y="6406397"/>
+            <a:ext cx="840921" cy="307777"/>
+          </a:xfrm>
+          <a:prstGeom prst="rect">
+            <a:avLst/>
+          </a:prstGeom>
+          <a:noFill/>
+        </p:spPr>
+        <p:txBody>
+          <a:bodyPr wrap="square" rtlCol="0">
+            <a:spAutoFit/>
+          </a:bodyPr>
+          <a:lstStyle/>
+          <a:p>
+            <a:r>
+              <a:rPr lang="en-US" sz="1400" b="1" dirty="0"/>
+              <a:t>Fig.1</a:t>
+            </a:r>
+          </a:p>
+        </p:txBody>
+      </p:sp>
+      <p:sp>
+        <p:nvSpPr>
+          <p:cNvPr id="19" name="TextBox 18">
+            <a:extLst>
+              <a:ext uri="{FF2B5EF4-FFF2-40B4-BE49-F238E27FC236}">
+                <a16:creationId xmlns:a16="http://schemas.microsoft.com/office/drawing/2014/main" id="{BB5C1AF0-F942-43EC-8E78-ED4EA77E28F2}"/>
+              </a:ext>
+            </a:extLst>
+          </p:cNvPr>
+          <p:cNvSpPr txBox="1"/>
+          <p:nvPr/>
+        </p:nvSpPr>
+        <p:spPr>
+          <a:xfrm>
+            <a:off x="8079714" y="6435348"/>
+            <a:ext cx="840921" cy="307777"/>
+          </a:xfrm>
+          <a:prstGeom prst="rect">
+            <a:avLst/>
+          </a:prstGeom>
+          <a:noFill/>
+        </p:spPr>
+        <p:txBody>
+          <a:bodyPr wrap="square" rtlCol="0">
+            <a:spAutoFit/>
+          </a:bodyPr>
+          <a:lstStyle/>
+          <a:p>
+            <a:r>
+              <a:rPr lang="en-US" sz="1400" b="1" dirty="0"/>
+              <a:t>Fig.2</a:t>
+            </a:r>
+          </a:p>
+        </p:txBody>
+      </p:sp>
+      <p:sp>
+        <p:nvSpPr>
+          <p:cNvPr id="20" name="TextBox 19">
+            <a:extLst>
+              <a:ext uri="{FF2B5EF4-FFF2-40B4-BE49-F238E27FC236}">
+                <a16:creationId xmlns:a16="http://schemas.microsoft.com/office/drawing/2014/main" id="{5E6B0A5B-4A6B-40D6-BE69-9FB2EE8FCF32}"/>
+              </a:ext>
+            </a:extLst>
+          </p:cNvPr>
+          <p:cNvSpPr txBox="1"/>
+          <p:nvPr/>
+        </p:nvSpPr>
+        <p:spPr>
+          <a:xfrm>
+            <a:off x="10567406" y="6405560"/>
+            <a:ext cx="840921" cy="307777"/>
+          </a:xfrm>
+          <a:prstGeom prst="rect">
+            <a:avLst/>
+          </a:prstGeom>
+          <a:noFill/>
+        </p:spPr>
+        <p:txBody>
+          <a:bodyPr wrap="square" rtlCol="0">
+            <a:spAutoFit/>
+          </a:bodyPr>
+          <a:lstStyle/>
+          <a:p>
+            <a:r>
+              <a:rPr lang="en-US" sz="1400" b="1" dirty="0"/>
+              <a:t>Fig.3</a:t>
+            </a:r>
+          </a:p>
+        </p:txBody>
+      </p:sp>
     </p:spTree>
     <p:extLst>
       <p:ext uri="{BB962C8B-B14F-4D97-AF65-F5344CB8AC3E}">
@@ -10807,35 +11134,6 @@
           <a:chExt cx="0" cy="0"/>
         </a:xfrm>
       </p:grpSpPr>
-      <p:pic>
-        <p:nvPicPr>
-          <p:cNvPr id="14" name="Picture 13">
-            <a:extLst>
-              <a:ext uri="{FF2B5EF4-FFF2-40B4-BE49-F238E27FC236}">
-                <a16:creationId xmlns:a16="http://schemas.microsoft.com/office/drawing/2014/main" id="{92475E2E-DBFA-487A-B2E1-11427D6093E7}"/>
-              </a:ext>
-            </a:extLst>
-          </p:cNvPr>
-          <p:cNvPicPr>
-            <a:picLocks noChangeAspect="1"/>
-          </p:cNvPicPr>
-          <p:nvPr/>
-        </p:nvPicPr>
-        <p:blipFill rotWithShape="1">
-          <a:blip r:embed="rId2"/>
-          <a:srcRect r="1856"/>
-          <a:stretch/>
-        </p:blipFill>
-        <p:spPr>
-          <a:xfrm>
-            <a:off x="172285" y="1078780"/>
-            <a:ext cx="5023169" cy="2288028"/>
-          </a:xfrm>
-          <a:prstGeom prst="rect">
-            <a:avLst/>
-          </a:prstGeom>
-        </p:spPr>
-      </p:pic>
       <p:sp>
         <p:nvSpPr>
           <p:cNvPr id="5" name="Text Placeholder 4">
@@ -10903,13 +11201,13 @@
           <p:nvPr>
             <p:extLst>
               <p:ext uri="{D42A27DB-BD31-4B8C-83A1-F6EECF244321}">
-                <p14:modId xmlns:p14="http://schemas.microsoft.com/office/powerpoint/2010/main" val="3199247420"/>
+                <p14:modId xmlns:p14="http://schemas.microsoft.com/office/powerpoint/2010/main" val="3105812686"/>
               </p:ext>
             </p:extLst>
           </p:nvPr>
         </p:nvGraphicFramePr>
         <p:xfrm>
-          <a:off x="5382187" y="1187883"/>
+          <a:off x="5382187" y="1142062"/>
           <a:ext cx="2281686" cy="997211"/>
         </p:xfrm>
         <a:graphic>
@@ -11451,85 +11749,135 @@
           </a:p>
         </p:txBody>
       </p:sp>
-      <p:sp>
-        <p:nvSpPr>
-          <p:cNvPr id="11" name="TextBox 10">
+      <p:grpSp>
+        <p:nvGrpSpPr>
+          <p:cNvPr id="3" name="Group 2">
             <a:extLst>
               <a:ext uri="{FF2B5EF4-FFF2-40B4-BE49-F238E27FC236}">
-                <a16:creationId xmlns:a16="http://schemas.microsoft.com/office/drawing/2014/main" id="{8B1C5635-9FEB-4697-981D-66C5696A2EB1}"/>
+                <a16:creationId xmlns:a16="http://schemas.microsoft.com/office/drawing/2014/main" id="{495D9171-D00D-4209-9109-F13ADEC3E373}"/>
               </a:ext>
             </a:extLst>
           </p:cNvPr>
-          <p:cNvSpPr txBox="1"/>
+          <p:cNvGrpSpPr/>
           <p:nvPr/>
-        </p:nvSpPr>
-        <p:spPr>
+        </p:nvGrpSpPr>
+        <p:grpSpPr>
           <a:xfrm>
-            <a:off x="1919068" y="1755521"/>
-            <a:ext cx="682674" cy="338554"/>
+            <a:off x="172285" y="832209"/>
+            <a:ext cx="5023169" cy="2288028"/>
+            <a:chOff x="172285" y="1078780"/>
+            <a:chExt cx="5023169" cy="2288028"/>
           </a:xfrm>
-          <a:prstGeom prst="rect">
-            <a:avLst/>
-          </a:prstGeom>
-          <a:noFill/>
-        </p:spPr>
-        <p:txBody>
-          <a:bodyPr wrap="square" rtlCol="0">
-            <a:spAutoFit/>
-          </a:bodyPr>
-          <a:lstStyle/>
-          <a:p>
-            <a:r>
-              <a:rPr lang="en-US" sz="1600" dirty="0"/>
-              <a:t>k = 4</a:t>
-            </a:r>
-          </a:p>
-        </p:txBody>
-      </p:sp>
-      <p:cxnSp>
-        <p:nvCxnSpPr>
-          <p:cNvPr id="12" name="Straight Arrow Connector 11">
-            <a:extLst>
-              <a:ext uri="{FF2B5EF4-FFF2-40B4-BE49-F238E27FC236}">
-                <a16:creationId xmlns:a16="http://schemas.microsoft.com/office/drawing/2014/main" id="{5428F4FE-EDD2-41C0-9B50-A4E4BF379922}"/>
-              </a:ext>
-            </a:extLst>
-          </p:cNvPr>
-          <p:cNvCxnSpPr>
-            <a:cxnSpLocks/>
-          </p:cNvCxnSpPr>
-          <p:nvPr/>
-        </p:nvCxnSpPr>
-        <p:spPr>
-          <a:xfrm>
-            <a:off x="2260405" y="2016159"/>
-            <a:ext cx="0" cy="337870"/>
-          </a:xfrm>
-          <a:prstGeom prst="straightConnector1">
-            <a:avLst/>
-          </a:prstGeom>
-          <a:ln>
-            <a:solidFill>
-              <a:srgbClr val="FF0000"/>
-            </a:solidFill>
-            <a:tailEnd type="triangle"/>
-          </a:ln>
-        </p:spPr>
-        <p:style>
-          <a:lnRef idx="1">
-            <a:schemeClr val="accent1"/>
-          </a:lnRef>
-          <a:fillRef idx="0">
-            <a:schemeClr val="accent1"/>
-          </a:fillRef>
-          <a:effectRef idx="0">
-            <a:schemeClr val="accent1"/>
-          </a:effectRef>
-          <a:fontRef idx="minor">
-            <a:schemeClr val="tx1"/>
-          </a:fontRef>
-        </p:style>
-      </p:cxnSp>
+        </p:grpSpPr>
+        <p:pic>
+          <p:nvPicPr>
+            <p:cNvPr id="14" name="Picture 13">
+              <a:extLst>
+                <a:ext uri="{FF2B5EF4-FFF2-40B4-BE49-F238E27FC236}">
+                  <a16:creationId xmlns:a16="http://schemas.microsoft.com/office/drawing/2014/main" id="{92475E2E-DBFA-487A-B2E1-11427D6093E7}"/>
+                </a:ext>
+              </a:extLst>
+            </p:cNvPr>
+            <p:cNvPicPr>
+              <a:picLocks noChangeAspect="1"/>
+            </p:cNvPicPr>
+            <p:nvPr/>
+          </p:nvPicPr>
+          <p:blipFill rotWithShape="1">
+            <a:blip r:embed="rId2"/>
+            <a:srcRect r="1856"/>
+            <a:stretch/>
+          </p:blipFill>
+          <p:spPr>
+            <a:xfrm>
+              <a:off x="172285" y="1078780"/>
+              <a:ext cx="5023169" cy="2288028"/>
+            </a:xfrm>
+            <a:prstGeom prst="rect">
+              <a:avLst/>
+            </a:prstGeom>
+          </p:spPr>
+        </p:pic>
+        <p:sp>
+          <p:nvSpPr>
+            <p:cNvPr id="11" name="TextBox 10">
+              <a:extLst>
+                <a:ext uri="{FF2B5EF4-FFF2-40B4-BE49-F238E27FC236}">
+                  <a16:creationId xmlns:a16="http://schemas.microsoft.com/office/drawing/2014/main" id="{8B1C5635-9FEB-4697-981D-66C5696A2EB1}"/>
+                </a:ext>
+              </a:extLst>
+            </p:cNvPr>
+            <p:cNvSpPr txBox="1"/>
+            <p:nvPr/>
+          </p:nvSpPr>
+          <p:spPr>
+            <a:xfrm>
+              <a:off x="1919068" y="1755521"/>
+              <a:ext cx="682674" cy="338554"/>
+            </a:xfrm>
+            <a:prstGeom prst="rect">
+              <a:avLst/>
+            </a:prstGeom>
+            <a:noFill/>
+          </p:spPr>
+          <p:txBody>
+            <a:bodyPr wrap="square" rtlCol="0">
+              <a:spAutoFit/>
+            </a:bodyPr>
+            <a:lstStyle/>
+            <a:p>
+              <a:r>
+                <a:rPr lang="en-US" sz="1600" dirty="0"/>
+                <a:t>k = 4</a:t>
+              </a:r>
+            </a:p>
+          </p:txBody>
+        </p:sp>
+        <p:cxnSp>
+          <p:nvCxnSpPr>
+            <p:cNvPr id="12" name="Straight Arrow Connector 11">
+              <a:extLst>
+                <a:ext uri="{FF2B5EF4-FFF2-40B4-BE49-F238E27FC236}">
+                  <a16:creationId xmlns:a16="http://schemas.microsoft.com/office/drawing/2014/main" id="{5428F4FE-EDD2-41C0-9B50-A4E4BF379922}"/>
+                </a:ext>
+              </a:extLst>
+            </p:cNvPr>
+            <p:cNvCxnSpPr>
+              <a:cxnSpLocks/>
+            </p:cNvCxnSpPr>
+            <p:nvPr/>
+          </p:nvCxnSpPr>
+          <p:spPr>
+            <a:xfrm>
+              <a:off x="2260405" y="2016159"/>
+              <a:ext cx="0" cy="337870"/>
+            </a:xfrm>
+            <a:prstGeom prst="straightConnector1">
+              <a:avLst/>
+            </a:prstGeom>
+            <a:ln>
+              <a:solidFill>
+                <a:srgbClr val="FF0000"/>
+              </a:solidFill>
+              <a:tailEnd type="triangle"/>
+            </a:ln>
+          </p:spPr>
+          <p:style>
+            <a:lnRef idx="1">
+              <a:schemeClr val="accent1"/>
+            </a:lnRef>
+            <a:fillRef idx="0">
+              <a:schemeClr val="accent1"/>
+            </a:fillRef>
+            <a:effectRef idx="0">
+              <a:schemeClr val="accent1"/>
+            </a:effectRef>
+            <a:fontRef idx="minor">
+              <a:schemeClr val="tx1"/>
+            </a:fontRef>
+          </p:style>
+        </p:cxnSp>
+      </p:grpSp>
       <p:pic>
         <p:nvPicPr>
           <p:cNvPr id="38" name="Picture 37">
@@ -11552,7 +11900,7 @@
         </p:blipFill>
         <p:spPr>
           <a:xfrm>
-            <a:off x="495245" y="3769531"/>
+            <a:off x="465432" y="3411366"/>
             <a:ext cx="4886942" cy="2944643"/>
           </a:xfrm>
           <a:prstGeom prst="rect">
@@ -11589,7 +11937,7 @@
         </p:blipFill>
         <p:spPr>
           <a:xfrm>
-            <a:off x="6921327" y="3553444"/>
+            <a:off x="6921327" y="3120237"/>
             <a:ext cx="4302098" cy="3265393"/>
           </a:xfrm>
           <a:prstGeom prst="rect">
@@ -11619,13 +11967,13 @@
           <p:nvPr>
             <p:extLst>
               <p:ext uri="{D42A27DB-BD31-4B8C-83A1-F6EECF244321}">
-                <p14:modId xmlns:p14="http://schemas.microsoft.com/office/powerpoint/2010/main" val="4176387365"/>
+                <p14:modId xmlns:p14="http://schemas.microsoft.com/office/powerpoint/2010/main" val="3366651219"/>
               </p:ext>
             </p:extLst>
           </p:nvPr>
         </p:nvGraphicFramePr>
         <p:xfrm>
-          <a:off x="7947064" y="1230539"/>
+          <a:off x="7947064" y="1142062"/>
           <a:ext cx="3614554" cy="1707686"/>
         </p:xfrm>
         <a:graphic>
@@ -12446,6 +12794,76 @@
           </a:graphicData>
         </a:graphic>
       </p:graphicFrame>
+      <p:sp>
+        <p:nvSpPr>
+          <p:cNvPr id="13" name="TextBox 12">
+            <a:extLst>
+              <a:ext uri="{FF2B5EF4-FFF2-40B4-BE49-F238E27FC236}">
+                <a16:creationId xmlns:a16="http://schemas.microsoft.com/office/drawing/2014/main" id="{7983CD28-0407-431E-A864-78303DA6F203}"/>
+              </a:ext>
+            </a:extLst>
+          </p:cNvPr>
+          <p:cNvSpPr txBox="1"/>
+          <p:nvPr/>
+        </p:nvSpPr>
+        <p:spPr>
+          <a:xfrm>
+            <a:off x="1998494" y="6406397"/>
+            <a:ext cx="840921" cy="307777"/>
+          </a:xfrm>
+          <a:prstGeom prst="rect">
+            <a:avLst/>
+          </a:prstGeom>
+          <a:noFill/>
+        </p:spPr>
+        <p:txBody>
+          <a:bodyPr wrap="square" rtlCol="0">
+            <a:spAutoFit/>
+          </a:bodyPr>
+          <a:lstStyle/>
+          <a:p>
+            <a:r>
+              <a:rPr lang="en-US" sz="1400" b="1" dirty="0"/>
+              <a:t>Fig.1</a:t>
+            </a:r>
+          </a:p>
+        </p:txBody>
+      </p:sp>
+      <p:sp>
+        <p:nvSpPr>
+          <p:cNvPr id="15" name="TextBox 14">
+            <a:extLst>
+              <a:ext uri="{FF2B5EF4-FFF2-40B4-BE49-F238E27FC236}">
+                <a16:creationId xmlns:a16="http://schemas.microsoft.com/office/drawing/2014/main" id="{486639E4-D551-4F92-BCB6-0AC5341292D1}"/>
+              </a:ext>
+            </a:extLst>
+          </p:cNvPr>
+          <p:cNvSpPr txBox="1"/>
+          <p:nvPr/>
+        </p:nvSpPr>
+        <p:spPr>
+          <a:xfrm>
+            <a:off x="8079714" y="6435348"/>
+            <a:ext cx="840921" cy="307777"/>
+          </a:xfrm>
+          <a:prstGeom prst="rect">
+            <a:avLst/>
+          </a:prstGeom>
+          <a:noFill/>
+        </p:spPr>
+        <p:txBody>
+          <a:bodyPr wrap="square" rtlCol="0">
+            <a:spAutoFit/>
+          </a:bodyPr>
+          <a:lstStyle/>
+          <a:p>
+            <a:r>
+              <a:rPr lang="en-US" sz="1400" b="1" dirty="0"/>
+              <a:t>Fig.2</a:t>
+            </a:r>
+          </a:p>
+        </p:txBody>
+      </p:sp>
     </p:spTree>
     <p:extLst>
       <p:ext uri="{BB962C8B-B14F-4D97-AF65-F5344CB8AC3E}">

</xml_diff>

<commit_message>
Fixed a typo in the PowerPoint presentation
</commit_message>
<xml_diff>
--- a/Farida_Stocks_Presentation/Stock_Presentation_Farida_v3.pptx
+++ b/Farida_Stocks_Presentation/Stock_Presentation_Farida_v3.pptx
@@ -6806,7 +6806,21 @@
                 <a:latin typeface="Arial" panose="020B0604020202020204" pitchFamily="34" charset="0"/>
                 <a:cs typeface="Arial" panose="020B0604020202020204" pitchFamily="34" charset="0"/>
               </a:rPr>
-              <a:t>All stocks trends from Jan 01, 2020, until Oct 20, 2021</a:t>
+              <a:t>All stocks trends from Jan 01, 2020, until </a:t>
+            </a:r>
+            <a:r>
+              <a:rPr lang="en-US" sz="2400">
+                <a:latin typeface="Arial" panose="020B0604020202020204" pitchFamily="34" charset="0"/>
+                <a:cs typeface="Arial" panose="020B0604020202020204" pitchFamily="34" charset="0"/>
+              </a:rPr>
+              <a:t>Oct 28, </a:t>
+            </a:r>
+            <a:r>
+              <a:rPr lang="en-US" sz="2400" dirty="0">
+                <a:latin typeface="Arial" panose="020B0604020202020204" pitchFamily="34" charset="0"/>
+                <a:cs typeface="Arial" panose="020B0604020202020204" pitchFamily="34" charset="0"/>
+              </a:rPr>
+              <a:t>2021</a:t>
             </a:r>
           </a:p>
         </p:txBody>

</xml_diff>